<commit_message>
Últimos cambios en las diapositivas del evento Tecnotic 2019
</commit_message>
<xml_diff>
--- a/Documentos de ponencias en eventos/Tecnotic 2019/Exposición - Tecnotic 2019.pptx
+++ b/Documentos de ponencias en eventos/Tecnotic 2019/Exposición - Tecnotic 2019.pptx
@@ -7430,8 +7430,8 @@
         </p:nvSpPr>
         <p:spPr>
           <a:xfrm>
-            <a:off x="1627201" y="2030454"/>
-            <a:ext cx="5889596" cy="489735"/>
+            <a:off x="1627202" y="2089177"/>
+            <a:ext cx="5889596" cy="385575"/>
           </a:xfrm>
         </p:spPr>
         <p:txBody>
@@ -7729,48 +7729,6 @@
           <a:chExt cx="0" cy="0"/>
         </a:xfrm>
       </p:grpSpPr>
-      <p:sp>
-        <p:nvSpPr>
-          <p:cNvPr id="6" name="Título 5"/>
-          <p:cNvSpPr>
-            <a:spLocks noGrp="1"/>
-          </p:cNvSpPr>
-          <p:nvPr>
-            <p:ph type="title"/>
-          </p:nvPr>
-        </p:nvSpPr>
-        <p:spPr>
-          <a:xfrm>
-            <a:off x="2056147" y="589610"/>
-            <a:ext cx="6848788" cy="768477"/>
-          </a:xfrm>
-        </p:spPr>
-        <p:txBody>
-          <a:bodyPr>
-            <a:normAutofit/>
-          </a:bodyPr>
-          <a:lstStyle/>
-          <a:p>
-            <a:r>
-              <a:rPr lang="es-CO" sz="2500" b="1" dirty="0">
-                <a:solidFill>
-                  <a:schemeClr val="bg1"/>
-                </a:solidFill>
-                <a:latin typeface="Arial" panose="020B0604020202020204" pitchFamily="34" charset="0"/>
-                <a:cs typeface="Arial" panose="020B0604020202020204" pitchFamily="34" charset="0"/>
-              </a:rPr>
-              <a:t>6. Resultados (2/2)</a:t>
-            </a:r>
-            <a:endParaRPr lang="es-ES" sz="2500" b="1" dirty="0">
-              <a:solidFill>
-                <a:schemeClr val="bg1"/>
-              </a:solidFill>
-              <a:latin typeface="Times New Roman" panose="02020603050405020304" pitchFamily="18" charset="0"/>
-              <a:cs typeface="Times New Roman" panose="02020603050405020304" pitchFamily="18" charset="0"/>
-            </a:endParaRPr>
-          </a:p>
-        </p:txBody>
-      </p:sp>
       <p:pic>
         <p:nvPicPr>
           <p:cNvPr id="4" name="Imagen 3">
@@ -7793,7 +7751,7 @@
         </p:blipFill>
         <p:spPr>
           <a:xfrm>
-            <a:off x="210597" y="2256731"/>
+            <a:off x="177041" y="2256731"/>
             <a:ext cx="5041732" cy="3306261"/>
           </a:xfrm>
           <a:prstGeom prst="rect">
@@ -7830,8 +7788,8 @@
         </p:blipFill>
         <p:spPr>
           <a:xfrm>
-            <a:off x="5381483" y="1979732"/>
-            <a:ext cx="3610643" cy="3583260"/>
+            <a:off x="5313499" y="1979732"/>
+            <a:ext cx="3653460" cy="3583260"/>
           </a:xfrm>
           <a:ln w="6350">
             <a:noFill/>
@@ -7852,7 +7810,7 @@
         </p:nvSpPr>
         <p:spPr>
           <a:xfrm>
-            <a:off x="210597" y="1979732"/>
+            <a:off x="177041" y="1979732"/>
             <a:ext cx="5041732" cy="276999"/>
           </a:xfrm>
           <a:prstGeom prst="rect">
@@ -7879,6 +7837,54 @@
               </a:rPr>
               <a:t>Repositorio del proyecto, visto desde la aplicación web de GitHub</a:t>
             </a:r>
+          </a:p>
+        </p:txBody>
+      </p:sp>
+      <p:sp>
+        <p:nvSpPr>
+          <p:cNvPr id="8" name="Título 5">
+            <a:extLst>
+              <a:ext uri="{FF2B5EF4-FFF2-40B4-BE49-F238E27FC236}">
+                <a16:creationId xmlns:a16="http://schemas.microsoft.com/office/drawing/2014/main" id="{24E20B76-5489-4691-AAAB-982771810931}"/>
+              </a:ext>
+            </a:extLst>
+          </p:cNvPr>
+          <p:cNvSpPr>
+            <a:spLocks noGrp="1"/>
+          </p:cNvSpPr>
+          <p:nvPr>
+            <p:ph type="title"/>
+          </p:nvPr>
+        </p:nvSpPr>
+        <p:spPr>
+          <a:xfrm>
+            <a:off x="2022591" y="589610"/>
+            <a:ext cx="6848788" cy="768477"/>
+          </a:xfrm>
+        </p:spPr>
+        <p:txBody>
+          <a:bodyPr>
+            <a:normAutofit/>
+          </a:bodyPr>
+          <a:lstStyle/>
+          <a:p>
+            <a:r>
+              <a:rPr lang="es-CO" sz="2500" b="1" dirty="0">
+                <a:solidFill>
+                  <a:schemeClr val="bg1"/>
+                </a:solidFill>
+                <a:latin typeface="Arial" panose="020B0604020202020204" pitchFamily="34" charset="0"/>
+                <a:cs typeface="Arial" panose="020B0604020202020204" pitchFamily="34" charset="0"/>
+              </a:rPr>
+              <a:t>6. Resultados (2/2)</a:t>
+            </a:r>
+            <a:endParaRPr lang="es-ES" sz="2500" b="1" dirty="0">
+              <a:solidFill>
+                <a:schemeClr val="bg1"/>
+              </a:solidFill>
+              <a:latin typeface="Arial" panose="020B0604020202020204" pitchFamily="34" charset="0"/>
+              <a:cs typeface="Arial" panose="020B0604020202020204" pitchFamily="34" charset="0"/>
+            </a:endParaRPr>
           </a:p>
         </p:txBody>
       </p:sp>
@@ -8116,8 +8122,8 @@
         </p:nvSpPr>
         <p:spPr>
           <a:xfrm>
-            <a:off x="628650" y="1800457"/>
-            <a:ext cx="7886700" cy="4843623"/>
+            <a:off x="628650" y="1951460"/>
+            <a:ext cx="7886700" cy="4013112"/>
           </a:xfrm>
         </p:spPr>
         <p:txBody>
@@ -8672,7 +8678,7 @@
         </p:nvSpPr>
         <p:spPr>
           <a:xfrm>
-            <a:off x="403404" y="1880671"/>
+            <a:off x="462127" y="1889060"/>
             <a:ext cx="6848788" cy="3930927"/>
           </a:xfrm>
         </p:spPr>
@@ -9161,10 +9167,10 @@
       </p:sp>
       <p:pic>
         <p:nvPicPr>
-          <p:cNvPr id="3" name="Imagen 2">
+          <p:cNvPr id="8" name="Imagen 7">
             <a:extLst>
               <a:ext uri="{FF2B5EF4-FFF2-40B4-BE49-F238E27FC236}">
-                <a16:creationId xmlns:a16="http://schemas.microsoft.com/office/drawing/2014/main" id="{7A006D5C-F0C3-49A4-8685-576E778C5B65}"/>
+                <a16:creationId xmlns:a16="http://schemas.microsoft.com/office/drawing/2014/main" id="{D61D2FCE-D1E3-455D-A5B2-41902A50AAFD}"/>
               </a:ext>
             </a:extLst>
           </p:cNvPr>
@@ -9174,25 +9180,25 @@
           <p:nvPr/>
         </p:nvPicPr>
         <p:blipFill>
-          <a:blip r:embed="rId3" cstate="print">
-            <a:extLst>
-              <a:ext uri="{28A0092B-C50C-407E-A947-70E740481C1C}">
-                <a14:useLocalDpi xmlns:a14="http://schemas.microsoft.com/office/drawing/2010/main" val="0"/>
-              </a:ext>
-            </a:extLst>
-          </a:blip>
+          <a:blip r:embed="rId3"/>
           <a:stretch>
             <a:fillRect/>
           </a:stretch>
         </p:blipFill>
         <p:spPr>
           <a:xfrm>
-            <a:off x="3329217" y="3867325"/>
-            <a:ext cx="2485563" cy="2057331"/>
+            <a:off x="3057721" y="3610486"/>
+            <a:ext cx="3028557" cy="1893075"/>
           </a:xfrm>
           <a:prstGeom prst="rect">
             <a:avLst/>
           </a:prstGeom>
+          <a:ln>
+            <a:noFill/>
+          </a:ln>
+          <a:effectLst>
+            <a:softEdge rad="112500"/>
+          </a:effectLst>
         </p:spPr>
       </p:pic>
     </p:spTree>
@@ -9271,47 +9277,6 @@
           </a:p>
         </p:txBody>
       </p:sp>
-      <p:pic>
-        <p:nvPicPr>
-          <p:cNvPr id="4" name="Picture 2" descr="Resultado de imagen para desconexion"/>
-          <p:cNvPicPr>
-            <a:picLocks noChangeAspect="1" noChangeArrowheads="1"/>
-          </p:cNvPicPr>
-          <p:nvPr/>
-        </p:nvPicPr>
-        <p:blipFill>
-          <a:blip r:embed="rId3" cstate="print">
-            <a:extLst>
-              <a:ext uri="{28A0092B-C50C-407E-A947-70E740481C1C}">
-                <a14:useLocalDpi xmlns:a14="http://schemas.microsoft.com/office/drawing/2010/main" val="0"/>
-              </a:ext>
-            </a:extLst>
-          </a:blip>
-          <a:srcRect/>
-          <a:stretch>
-            <a:fillRect/>
-          </a:stretch>
-        </p:blipFill>
-        <p:spPr bwMode="auto">
-          <a:xfrm>
-            <a:off x="7754560" y="487236"/>
-            <a:ext cx="1389440" cy="1006003"/>
-          </a:xfrm>
-          <a:prstGeom prst="rect">
-            <a:avLst/>
-          </a:prstGeom>
-          <a:noFill/>
-          <a:extLst>
-            <a:ext uri="{909E8E84-426E-40DD-AFC4-6F175D3DCCD1}">
-              <a14:hiddenFill xmlns:a14="http://schemas.microsoft.com/office/drawing/2010/main">
-                <a:solidFill>
-                  <a:srgbClr val="FFFFFF"/>
-                </a:solidFill>
-              </a14:hiddenFill>
-            </a:ext>
-          </a:extLst>
-        </p:spPr>
-      </p:pic>
       <p:sp>
         <p:nvSpPr>
           <p:cNvPr id="3" name="Marcador de contenido 2"/>
@@ -9324,8 +9289,8 @@
         </p:nvSpPr>
         <p:spPr>
           <a:xfrm>
-            <a:off x="360727" y="1825625"/>
-            <a:ext cx="8154623" cy="917575"/>
+            <a:off x="360727" y="1911419"/>
+            <a:ext cx="8544208" cy="682683"/>
           </a:xfrm>
         </p:spPr>
         <p:txBody>
@@ -9365,7 +9330,7 @@
           <p:nvPr/>
         </p:nvPicPr>
         <p:blipFill>
-          <a:blip r:embed="rId4"/>
+          <a:blip r:embed="rId3"/>
           <a:stretch>
             <a:fillRect/>
           </a:stretch>
@@ -9433,7 +9398,7 @@
         </p:nvSpPr>
         <p:spPr>
           <a:xfrm>
-            <a:off x="102131" y="2933948"/>
+            <a:off x="160854" y="2841669"/>
             <a:ext cx="3242970" cy="495052"/>
           </a:xfrm>
         </p:spPr>
@@ -9469,8 +9434,8 @@
         </p:nvSpPr>
         <p:spPr>
           <a:xfrm>
-            <a:off x="3676434" y="365716"/>
-            <a:ext cx="5178167" cy="6018306"/>
+            <a:off x="3693212" y="528904"/>
+            <a:ext cx="5178167" cy="5615634"/>
           </a:xfrm>
         </p:spPr>
         <p:txBody>
@@ -9479,11 +9444,11 @@
           </a:bodyPr>
           <a:lstStyle/>
           <a:p>
-            <a:pPr marL="0" indent="0" fontAlgn="base">
+            <a:pPr marL="0" indent="0">
               <a:buNone/>
             </a:pPr>
             <a:r>
-              <a:rPr lang="es-MX" sz="1800" b="1" dirty="0">
+              <a:rPr lang="es-CO" sz="1800" b="1" dirty="0">
                 <a:latin typeface="Arial" panose="020B0604020202020204" pitchFamily="34" charset="0"/>
                 <a:cs typeface="Arial" panose="020B0604020202020204" pitchFamily="34" charset="0"/>
               </a:rPr>
@@ -9491,17 +9456,20 @@
             </a:r>
           </a:p>
           <a:p>
-            <a:pPr algn="just"/>
-            <a:r>
-              <a:rPr lang="es-MX" sz="1800" dirty="0">
+            <a:r>
+              <a:rPr lang="es-CO" sz="1800" dirty="0">
                 <a:latin typeface="Arial" panose="020B0604020202020204" pitchFamily="34" charset="0"/>
                 <a:cs typeface="Arial" panose="020B0604020202020204" pitchFamily="34" charset="0"/>
               </a:rPr>
-              <a:t>Establecer un marco de trabajo orientado a procesos DevOps siguiendo los lineamientos dados por la ISO 29110 utilizando como caso de estudio la integración de procesos del proyecto San Ambiente.</a:t>
-            </a:r>
-          </a:p>
-          <a:p>
-            <a:pPr marL="0" indent="0" algn="just">
+              <a:t>Establecer un marco de trabajo siguiendo los lineamientos dados por la ISO/IEC 29110 utilizando como caso de estudio la integración de procesos del proyecto Sanambiente.</a:t>
+            </a:r>
+            <a:endParaRPr lang="es-CO" sz="1800" b="1" dirty="0">
+              <a:latin typeface="Arial" panose="020B0604020202020204" pitchFamily="34" charset="0"/>
+              <a:cs typeface="Arial" panose="020B0604020202020204" pitchFamily="34" charset="0"/>
+            </a:endParaRPr>
+          </a:p>
+          <a:p>
+            <a:pPr marL="0" indent="0">
               <a:buNone/>
             </a:pPr>
             <a:r>
@@ -9513,7 +9481,7 @@
             </a:r>
           </a:p>
           <a:p>
-            <a:pPr lvl="0" algn="just"/>
+            <a:pPr lvl="0"/>
             <a:r>
               <a:rPr lang="es-CO" sz="1800" dirty="0">
                 <a:latin typeface="Arial" panose="020B0604020202020204" pitchFamily="34" charset="0"/>
@@ -9523,17 +9491,17 @@
             </a:r>
           </a:p>
           <a:p>
-            <a:pPr lvl="0" algn="just"/>
+            <a:pPr lvl="0"/>
             <a:r>
               <a:rPr lang="es-CO" sz="1800" dirty="0">
                 <a:latin typeface="Arial" panose="020B0604020202020204" pitchFamily="34" charset="0"/>
                 <a:cs typeface="Arial" panose="020B0604020202020204" pitchFamily="34" charset="0"/>
               </a:rPr>
-              <a:t>Establecer la ruta de procesos y herramientas que permitan la integración de los módulos del proyecto de Sanambiente de acuerdo a la ISO/IEC 29110.</a:t>
-            </a:r>
-          </a:p>
-          <a:p>
-            <a:pPr lvl="0" algn="just"/>
+              <a:t>Establecer la ruta de procesos y herramientas que permitan la integración de los equipos del proyecto de Sanambiente de acuerdo a la ISO/IEC 29110.</a:t>
+            </a:r>
+          </a:p>
+          <a:p>
+            <a:pPr lvl="0"/>
             <a:r>
               <a:rPr lang="es-CO" sz="1800" dirty="0">
                 <a:latin typeface="Arial" panose="020B0604020202020204" pitchFamily="34" charset="0"/>
@@ -9543,33 +9511,22 @@
             </a:r>
           </a:p>
           <a:p>
-            <a:pPr algn="just"/>
             <a:r>
               <a:rPr lang="es-CO" sz="1800" dirty="0">
                 <a:latin typeface="Arial" panose="020B0604020202020204" pitchFamily="34" charset="0"/>
                 <a:cs typeface="Arial" panose="020B0604020202020204" pitchFamily="34" charset="0"/>
               </a:rPr>
-              <a:t>Evaluar los resultados de la aplicación del marco de trabajo siguiendo DevOps.</a:t>
-            </a:r>
-            <a:endParaRPr lang="es-ES" sz="1800" dirty="0">
-              <a:solidFill>
-                <a:schemeClr val="tx1">
-                  <a:lumMod val="75000"/>
-                  <a:lumOff val="25000"/>
-                </a:schemeClr>
-              </a:solidFill>
-              <a:latin typeface="Arial" panose="020B0604020202020204" pitchFamily="34" charset="0"/>
-              <a:cs typeface="Arial" panose="020B0604020202020204" pitchFamily="34" charset="0"/>
-            </a:endParaRPr>
+              <a:t>Evaluar los resultados de la aplicación del marco de trabajo de acuerdo a la ISO/IEC 29110.</a:t>
+            </a:r>
           </a:p>
         </p:txBody>
       </p:sp>
       <p:pic>
         <p:nvPicPr>
-          <p:cNvPr id="6" name="Imagen 5" descr="Imagen relacionada">
+          <p:cNvPr id="7" name="Imagen 6" descr="Imagen relacionada">
             <a:extLst>
               <a:ext uri="{FF2B5EF4-FFF2-40B4-BE49-F238E27FC236}">
-                <a16:creationId xmlns:a16="http://schemas.microsoft.com/office/drawing/2014/main" id="{A514ADF1-E86E-4935-9421-40E51CCAA554}"/>
+                <a16:creationId xmlns:a16="http://schemas.microsoft.com/office/drawing/2014/main" id="{D9229070-2645-4278-A5E5-28439C393813}"/>
               </a:ext>
             </a:extLst>
           </p:cNvPr>
@@ -9591,8 +9548,8 @@
         </p:blipFill>
         <p:spPr bwMode="auto">
           <a:xfrm>
-            <a:off x="788173" y="3496112"/>
-            <a:ext cx="1870885" cy="1761793"/>
+            <a:off x="1079808" y="3429000"/>
+            <a:ext cx="1405062" cy="1360004"/>
           </a:xfrm>
           <a:prstGeom prst="rect">
             <a:avLst/>
@@ -9699,7 +9656,12 @@
             <p:ph idx="1"/>
           </p:nvPr>
         </p:nvSpPr>
-        <p:spPr/>
+        <p:spPr>
+          <a:xfrm>
+            <a:off x="628650" y="1825625"/>
+            <a:ext cx="7886700" cy="3081935"/>
+          </a:xfrm>
+        </p:spPr>
         <p:txBody>
           <a:bodyPr>
             <a:normAutofit/>
@@ -9796,14 +9758,38 @@
               <a:t>La norma ha sido desarrollada para mejorar la calidad de los productos y/o servicios y el rendimiento de los procesos en pequeñas entidades de software que en el momento se encuentran aisladas de algunas actividades económicas, y de este modo contar con los mismos niveles de competitividad en el mercado que las grandes industrias. (ISO/IEC, 2011, p. vi)</a:t>
             </a:r>
           </a:p>
-          <a:p>
-            <a:endParaRPr lang="es-CO" sz="1800" dirty="0">
-              <a:latin typeface="Arial" panose="020B0604020202020204" pitchFamily="34" charset="0"/>
-              <a:cs typeface="Arial" panose="020B0604020202020204" pitchFamily="34" charset="0"/>
-            </a:endParaRPr>
-          </a:p>
         </p:txBody>
       </p:sp>
+      <p:pic>
+        <p:nvPicPr>
+          <p:cNvPr id="4" name="Imagen 3">
+            <a:extLst>
+              <a:ext uri="{FF2B5EF4-FFF2-40B4-BE49-F238E27FC236}">
+                <a16:creationId xmlns:a16="http://schemas.microsoft.com/office/drawing/2014/main" id="{428107FC-2A5C-4002-A387-50119493073A}"/>
+              </a:ext>
+            </a:extLst>
+          </p:cNvPr>
+          <p:cNvPicPr>
+            <a:picLocks noChangeAspect="1"/>
+          </p:cNvPicPr>
+          <p:nvPr/>
+        </p:nvPicPr>
+        <p:blipFill>
+          <a:blip r:embed="rId3"/>
+          <a:stretch>
+            <a:fillRect/>
+          </a:stretch>
+        </p:blipFill>
+        <p:spPr>
+          <a:xfrm>
+            <a:off x="2812009" y="4733087"/>
+            <a:ext cx="3519982" cy="1759991"/>
+          </a:xfrm>
+          <a:prstGeom prst="rect">
+            <a:avLst/>
+          </a:prstGeom>
+        </p:spPr>
+      </p:pic>
     </p:spTree>
     <p:extLst>
       <p:ext uri="{BB962C8B-B14F-4D97-AF65-F5344CB8AC3E}">
@@ -10903,7 +10889,7 @@
         </p:nvSpPr>
         <p:spPr>
           <a:xfrm>
-            <a:off x="501307" y="6138598"/>
+            <a:off x="628649" y="6138598"/>
             <a:ext cx="7266899" cy="338507"/>
           </a:xfrm>
           <a:prstGeom prst="rect">

</xml_diff>